<commit_message>
Fix Typo in the presentation ppt
</commit_message>
<xml_diff>
--- a/Presentation.pptx
+++ b/Presentation.pptx
@@ -231,7 +231,7 @@
           <a:p>
             <a:fld id="{1775A16F-A4DE-4D7C-87EB-FD1F8A24CE5B}" type="datetimeFigureOut">
               <a:rPr lang="it-IT" smtClean="0"/>
-              <a:t>17/01/2023</a:t>
+              <a:t>18/01/2023</a:t>
             </a:fld>
             <a:endParaRPr lang="it-IT"/>
           </a:p>
@@ -6417,7 +6417,23 @@
                   <a:srgbClr val="24292F"/>
                 </a:solidFill>
               </a:rPr>
-              <a:t> Iterate until the runs are sorted;</a:t>
+              <a:t> Iterate until the whole </a:t>
+            </a:r>
+            <a:r>
+              <a:rPr lang="en-US">
+                <a:solidFill>
+                  <a:srgbClr val="24292F"/>
+                </a:solidFill>
+              </a:rPr>
+              <a:t>relation is </a:t>
+            </a:r>
+            <a:r>
+              <a:rPr lang="en-US" dirty="0">
+                <a:solidFill>
+                  <a:srgbClr val="24292F"/>
+                </a:solidFill>
+              </a:rPr>
+              <a:t>sorted;</a:t>
             </a:r>
             <a:endParaRPr lang="en-US" sz="1800" b="0" i="0" u="none" strike="noStrike" baseline="0" dirty="0">
               <a:solidFill>

</xml_diff>